<commit_message>
update wijzigingsvoorstel ter vaststelling
</commit_message>
<xml_diff>
--- a/wijzigingsvoorstel/media/beslisbomen.pptx
+++ b/wijzigingsvoorstel/media/beslisbomen.pptx
@@ -7,6 +7,7 @@
   <p:sldIdLst>
     <p:sldId id="256" r:id="rId2"/>
     <p:sldId id="257" r:id="rId3"/>
+    <p:sldId id="258" r:id="rId4"/>
   </p:sldIdLst>
   <p:sldSz cx="12801600" cy="9601200" type="A3"/>
   <p:notesSz cx="9144000" cy="6858000"/>
@@ -7538,6 +7539,1865 @@
 </p:sld>
 </file>
 
+<file path=ppt/slides/slide3.xml><?xml version="1.0" encoding="utf-8"?>
+<p:sld xmlns:a="http://schemas.openxmlformats.org/drawingml/2006/main" xmlns:r="http://schemas.openxmlformats.org/officeDocument/2006/relationships" xmlns:p="http://schemas.openxmlformats.org/presentationml/2006/main">
+  <p:cSld>
+    <p:spTree>
+      <p:nvGrpSpPr>
+        <p:cNvPr id="1" name=""/>
+        <p:cNvGrpSpPr/>
+        <p:nvPr/>
+      </p:nvGrpSpPr>
+      <p:grpSpPr>
+        <a:xfrm>
+          <a:off x="0" y="0"/>
+          <a:ext cx="0" cy="0"/>
+          <a:chOff x="0" y="0"/>
+          <a:chExt cx="0" cy="0"/>
+        </a:xfrm>
+      </p:grpSpPr>
+      <p:sp>
+        <p:nvSpPr>
+          <p:cNvPr id="4" name="Rechthoek 3">
+            <a:extLst>
+              <a:ext uri="{FF2B5EF4-FFF2-40B4-BE49-F238E27FC236}">
+                <a16:creationId xmlns:a16="http://schemas.microsoft.com/office/drawing/2014/main" id="{3B24792C-542D-41C6-B9BF-F3F9973A80ED}"/>
+              </a:ext>
+            </a:extLst>
+          </p:cNvPr>
+          <p:cNvSpPr/>
+          <p:nvPr/>
+        </p:nvSpPr>
+        <p:spPr>
+          <a:xfrm>
+            <a:off x="3584448" y="1487424"/>
+            <a:ext cx="835152" cy="1956816"/>
+          </a:xfrm>
+          <a:prstGeom prst="rect">
+            <a:avLst/>
+          </a:prstGeom>
+        </p:spPr>
+        <p:style>
+          <a:lnRef idx="2">
+            <a:schemeClr val="accent3">
+              <a:shade val="50000"/>
+            </a:schemeClr>
+          </a:lnRef>
+          <a:fillRef idx="1">
+            <a:schemeClr val="accent3"/>
+          </a:fillRef>
+          <a:effectRef idx="0">
+            <a:schemeClr val="accent3"/>
+          </a:effectRef>
+          <a:fontRef idx="minor">
+            <a:schemeClr val="lt1"/>
+          </a:fontRef>
+        </p:style>
+        <p:txBody>
+          <a:bodyPr vert="horz" rtlCol="0" anchor="ctr"/>
+          <a:lstStyle/>
+          <a:p>
+            <a:pPr algn="ctr"/>
+            <a:r>
+              <a:rPr lang="nl-NL" sz="1200" dirty="0" err="1">
+                <a:solidFill>
+                  <a:schemeClr val="tx1"/>
+                </a:solidFill>
+              </a:rPr>
+              <a:t>wegdeel</a:t>
+            </a:r>
+            <a:endParaRPr lang="nl-NL" sz="1200" dirty="0">
+              <a:solidFill>
+                <a:schemeClr val="tx1"/>
+              </a:solidFill>
+            </a:endParaRPr>
+          </a:p>
+        </p:txBody>
+      </p:sp>
+      <p:sp>
+        <p:nvSpPr>
+          <p:cNvPr id="5" name="Rechthoek 4">
+            <a:extLst>
+              <a:ext uri="{FF2B5EF4-FFF2-40B4-BE49-F238E27FC236}">
+                <a16:creationId xmlns:a16="http://schemas.microsoft.com/office/drawing/2014/main" id="{FCCF75F0-4135-424B-B9D3-2B757540061A}"/>
+              </a:ext>
+            </a:extLst>
+          </p:cNvPr>
+          <p:cNvSpPr/>
+          <p:nvPr/>
+        </p:nvSpPr>
+        <p:spPr>
+          <a:xfrm>
+            <a:off x="4419600" y="1487424"/>
+            <a:ext cx="603504" cy="1956816"/>
+          </a:xfrm>
+          <a:prstGeom prst="rect">
+            <a:avLst/>
+          </a:prstGeom>
+        </p:spPr>
+        <p:style>
+          <a:lnRef idx="2">
+            <a:schemeClr val="accent6">
+              <a:shade val="50000"/>
+            </a:schemeClr>
+          </a:lnRef>
+          <a:fillRef idx="1">
+            <a:schemeClr val="accent6"/>
+          </a:fillRef>
+          <a:effectRef idx="0">
+            <a:schemeClr val="accent6"/>
+          </a:effectRef>
+          <a:fontRef idx="minor">
+            <a:schemeClr val="lt1"/>
+          </a:fontRef>
+        </p:style>
+        <p:txBody>
+          <a:bodyPr vert="horz" rtlCol="0" anchor="ctr"/>
+          <a:lstStyle/>
+          <a:p>
+            <a:pPr algn="ctr"/>
+            <a:r>
+              <a:rPr lang="nl-NL" sz="1200" dirty="0">
+                <a:solidFill>
+                  <a:schemeClr val="tx1"/>
+                </a:solidFill>
+              </a:rPr>
+              <a:t>berm</a:t>
+            </a:r>
+          </a:p>
+        </p:txBody>
+      </p:sp>
+      <p:sp>
+        <p:nvSpPr>
+          <p:cNvPr id="6" name="Rechthoek 5">
+            <a:extLst>
+              <a:ext uri="{FF2B5EF4-FFF2-40B4-BE49-F238E27FC236}">
+                <a16:creationId xmlns:a16="http://schemas.microsoft.com/office/drawing/2014/main" id="{22F5DBA8-CD2D-49C2-BDE9-8BA7BBCDE14A}"/>
+              </a:ext>
+            </a:extLst>
+          </p:cNvPr>
+          <p:cNvSpPr/>
+          <p:nvPr/>
+        </p:nvSpPr>
+        <p:spPr>
+          <a:xfrm>
+            <a:off x="2980944" y="1487424"/>
+            <a:ext cx="600456" cy="1956816"/>
+          </a:xfrm>
+          <a:prstGeom prst="rect">
+            <a:avLst/>
+          </a:prstGeom>
+        </p:spPr>
+        <p:style>
+          <a:lnRef idx="2">
+            <a:schemeClr val="accent6">
+              <a:shade val="50000"/>
+            </a:schemeClr>
+          </a:lnRef>
+          <a:fillRef idx="1">
+            <a:schemeClr val="accent6"/>
+          </a:fillRef>
+          <a:effectRef idx="0">
+            <a:schemeClr val="accent6"/>
+          </a:effectRef>
+          <a:fontRef idx="minor">
+            <a:schemeClr val="lt1"/>
+          </a:fontRef>
+        </p:style>
+        <p:txBody>
+          <a:bodyPr vert="horz" rtlCol="0" anchor="ctr"/>
+          <a:lstStyle/>
+          <a:p>
+            <a:pPr algn="ctr"/>
+            <a:r>
+              <a:rPr lang="nl-NL" sz="1200" dirty="0">
+                <a:solidFill>
+                  <a:schemeClr val="tx1"/>
+                </a:solidFill>
+              </a:rPr>
+              <a:t>berm</a:t>
+            </a:r>
+          </a:p>
+        </p:txBody>
+      </p:sp>
+      <p:sp>
+        <p:nvSpPr>
+          <p:cNvPr id="7" name="Rechthoek 6">
+            <a:extLst>
+              <a:ext uri="{FF2B5EF4-FFF2-40B4-BE49-F238E27FC236}">
+                <a16:creationId xmlns:a16="http://schemas.microsoft.com/office/drawing/2014/main" id="{51F3E9D3-11EF-4271-9948-54DCC476516F}"/>
+              </a:ext>
+            </a:extLst>
+          </p:cNvPr>
+          <p:cNvSpPr/>
+          <p:nvPr/>
+        </p:nvSpPr>
+        <p:spPr>
+          <a:xfrm>
+            <a:off x="2609088" y="1487424"/>
+            <a:ext cx="368808" cy="1956816"/>
+          </a:xfrm>
+          <a:prstGeom prst="rect">
+            <a:avLst/>
+          </a:prstGeom>
+          <a:solidFill>
+            <a:schemeClr val="accent1">
+              <a:lumMod val="60000"/>
+              <a:lumOff val="40000"/>
+            </a:schemeClr>
+          </a:solidFill>
+        </p:spPr>
+        <p:style>
+          <a:lnRef idx="2">
+            <a:schemeClr val="accent1">
+              <a:shade val="50000"/>
+            </a:schemeClr>
+          </a:lnRef>
+          <a:fillRef idx="1">
+            <a:schemeClr val="accent1"/>
+          </a:fillRef>
+          <a:effectRef idx="0">
+            <a:schemeClr val="accent1"/>
+          </a:effectRef>
+          <a:fontRef idx="minor">
+            <a:schemeClr val="lt1"/>
+          </a:fontRef>
+        </p:style>
+        <p:txBody>
+          <a:bodyPr vert="vert270" rtlCol="0" anchor="ctr"/>
+          <a:lstStyle/>
+          <a:p>
+            <a:pPr algn="ctr"/>
+            <a:r>
+              <a:rPr lang="nl-NL" sz="1200" dirty="0">
+                <a:solidFill>
+                  <a:schemeClr val="tx1"/>
+                </a:solidFill>
+              </a:rPr>
+              <a:t>water</a:t>
+            </a:r>
+          </a:p>
+        </p:txBody>
+      </p:sp>
+      <p:sp>
+        <p:nvSpPr>
+          <p:cNvPr id="8" name="Rechthoek 7">
+            <a:extLst>
+              <a:ext uri="{FF2B5EF4-FFF2-40B4-BE49-F238E27FC236}">
+                <a16:creationId xmlns:a16="http://schemas.microsoft.com/office/drawing/2014/main" id="{050A787E-8BBE-433A-AA86-72CC864B6A33}"/>
+              </a:ext>
+            </a:extLst>
+          </p:cNvPr>
+          <p:cNvSpPr/>
+          <p:nvPr/>
+        </p:nvSpPr>
+        <p:spPr>
+          <a:xfrm>
+            <a:off x="5023104" y="1487424"/>
+            <a:ext cx="835152" cy="1956816"/>
+          </a:xfrm>
+          <a:prstGeom prst="rect">
+            <a:avLst/>
+          </a:prstGeom>
+        </p:spPr>
+        <p:style>
+          <a:lnRef idx="2">
+            <a:schemeClr val="accent2">
+              <a:shade val="50000"/>
+            </a:schemeClr>
+          </a:lnRef>
+          <a:fillRef idx="1">
+            <a:schemeClr val="accent2"/>
+          </a:fillRef>
+          <a:effectRef idx="0">
+            <a:schemeClr val="accent2"/>
+          </a:effectRef>
+          <a:fontRef idx="minor">
+            <a:schemeClr val="lt1"/>
+          </a:fontRef>
+        </p:style>
+        <p:txBody>
+          <a:bodyPr vert="horz" rtlCol="0" anchor="ctr"/>
+          <a:lstStyle/>
+          <a:p>
+            <a:pPr algn="ctr"/>
+            <a:r>
+              <a:rPr lang="nl-NL" sz="1200" dirty="0">
+                <a:solidFill>
+                  <a:schemeClr val="tx1"/>
+                </a:solidFill>
+              </a:rPr>
+              <a:t>pand</a:t>
+            </a:r>
+          </a:p>
+        </p:txBody>
+      </p:sp>
+      <p:sp>
+        <p:nvSpPr>
+          <p:cNvPr id="9" name="Rechthoek 8">
+            <a:extLst>
+              <a:ext uri="{FF2B5EF4-FFF2-40B4-BE49-F238E27FC236}">
+                <a16:creationId xmlns:a16="http://schemas.microsoft.com/office/drawing/2014/main" id="{9FCA052B-44A7-4C1E-A97F-5C954B607B46}"/>
+              </a:ext>
+            </a:extLst>
+          </p:cNvPr>
+          <p:cNvSpPr/>
+          <p:nvPr/>
+        </p:nvSpPr>
+        <p:spPr>
+          <a:xfrm>
+            <a:off x="3587496" y="4099560"/>
+            <a:ext cx="835152" cy="1956816"/>
+          </a:xfrm>
+          <a:prstGeom prst="rect">
+            <a:avLst/>
+          </a:prstGeom>
+        </p:spPr>
+        <p:style>
+          <a:lnRef idx="2">
+            <a:schemeClr val="accent3">
+              <a:shade val="50000"/>
+            </a:schemeClr>
+          </a:lnRef>
+          <a:fillRef idx="1">
+            <a:schemeClr val="accent3"/>
+          </a:fillRef>
+          <a:effectRef idx="0">
+            <a:schemeClr val="accent3"/>
+          </a:effectRef>
+          <a:fontRef idx="minor">
+            <a:schemeClr val="lt1"/>
+          </a:fontRef>
+        </p:style>
+        <p:txBody>
+          <a:bodyPr vert="horz" rtlCol="0" anchor="ctr"/>
+          <a:lstStyle/>
+          <a:p>
+            <a:pPr algn="ctr"/>
+            <a:r>
+              <a:rPr lang="nl-NL" sz="1200" dirty="0" err="1">
+                <a:solidFill>
+                  <a:schemeClr val="tx1"/>
+                </a:solidFill>
+              </a:rPr>
+              <a:t>wegdeel</a:t>
+            </a:r>
+            <a:endParaRPr lang="nl-NL" sz="1200" dirty="0">
+              <a:solidFill>
+                <a:schemeClr val="tx1"/>
+              </a:solidFill>
+            </a:endParaRPr>
+          </a:p>
+        </p:txBody>
+      </p:sp>
+      <p:sp>
+        <p:nvSpPr>
+          <p:cNvPr id="10" name="Rechthoek 9">
+            <a:extLst>
+              <a:ext uri="{FF2B5EF4-FFF2-40B4-BE49-F238E27FC236}">
+                <a16:creationId xmlns:a16="http://schemas.microsoft.com/office/drawing/2014/main" id="{4F0C7B75-8CED-4761-8B25-201515C63157}"/>
+              </a:ext>
+            </a:extLst>
+          </p:cNvPr>
+          <p:cNvSpPr/>
+          <p:nvPr/>
+        </p:nvSpPr>
+        <p:spPr>
+          <a:xfrm>
+            <a:off x="4422648" y="4099560"/>
+            <a:ext cx="1438656" cy="1956816"/>
+          </a:xfrm>
+          <a:prstGeom prst="rect">
+            <a:avLst/>
+          </a:prstGeom>
+          <a:solidFill>
+            <a:schemeClr val="accent6">
+              <a:lumMod val="75000"/>
+            </a:schemeClr>
+          </a:solidFill>
+        </p:spPr>
+        <p:style>
+          <a:lnRef idx="2">
+            <a:schemeClr val="accent6">
+              <a:shade val="50000"/>
+            </a:schemeClr>
+          </a:lnRef>
+          <a:fillRef idx="1">
+            <a:schemeClr val="accent6"/>
+          </a:fillRef>
+          <a:effectRef idx="0">
+            <a:schemeClr val="accent6"/>
+          </a:effectRef>
+          <a:fontRef idx="minor">
+            <a:schemeClr val="lt1"/>
+          </a:fontRef>
+        </p:style>
+        <p:txBody>
+          <a:bodyPr vert="vert270" rtlCol="0" anchor="ctr"/>
+          <a:lstStyle/>
+          <a:p>
+            <a:pPr algn="ctr"/>
+            <a:endParaRPr lang="nl-NL"/>
+          </a:p>
+        </p:txBody>
+      </p:sp>
+      <p:sp>
+        <p:nvSpPr>
+          <p:cNvPr id="11" name="Rechthoek 10">
+            <a:extLst>
+              <a:ext uri="{FF2B5EF4-FFF2-40B4-BE49-F238E27FC236}">
+                <a16:creationId xmlns:a16="http://schemas.microsoft.com/office/drawing/2014/main" id="{1F5EF6FC-E489-430A-9C36-FF5EA70A0C95}"/>
+              </a:ext>
+            </a:extLst>
+          </p:cNvPr>
+          <p:cNvSpPr/>
+          <p:nvPr/>
+        </p:nvSpPr>
+        <p:spPr>
+          <a:xfrm>
+            <a:off x="2983992" y="4099560"/>
+            <a:ext cx="600456" cy="1956816"/>
+          </a:xfrm>
+          <a:prstGeom prst="rect">
+            <a:avLst/>
+          </a:prstGeom>
+        </p:spPr>
+        <p:style>
+          <a:lnRef idx="2">
+            <a:schemeClr val="accent6">
+              <a:shade val="50000"/>
+            </a:schemeClr>
+          </a:lnRef>
+          <a:fillRef idx="1">
+            <a:schemeClr val="accent6"/>
+          </a:fillRef>
+          <a:effectRef idx="0">
+            <a:schemeClr val="accent6"/>
+          </a:effectRef>
+          <a:fontRef idx="minor">
+            <a:schemeClr val="lt1"/>
+          </a:fontRef>
+        </p:style>
+        <p:txBody>
+          <a:bodyPr vert="horz" rtlCol="0" anchor="ctr"/>
+          <a:lstStyle/>
+          <a:p>
+            <a:pPr algn="ctr"/>
+            <a:r>
+              <a:rPr lang="nl-NL" sz="1200" dirty="0">
+                <a:solidFill>
+                  <a:schemeClr val="tx1"/>
+                </a:solidFill>
+              </a:rPr>
+              <a:t>berm</a:t>
+            </a:r>
+          </a:p>
+        </p:txBody>
+      </p:sp>
+      <p:sp>
+        <p:nvSpPr>
+          <p:cNvPr id="12" name="Rechthoek 11">
+            <a:extLst>
+              <a:ext uri="{FF2B5EF4-FFF2-40B4-BE49-F238E27FC236}">
+                <a16:creationId xmlns:a16="http://schemas.microsoft.com/office/drawing/2014/main" id="{FA722D85-38E3-4BCD-91A7-460B8687699C}"/>
+              </a:ext>
+            </a:extLst>
+          </p:cNvPr>
+          <p:cNvSpPr/>
+          <p:nvPr/>
+        </p:nvSpPr>
+        <p:spPr>
+          <a:xfrm>
+            <a:off x="2612136" y="4099560"/>
+            <a:ext cx="368808" cy="1956816"/>
+          </a:xfrm>
+          <a:prstGeom prst="rect">
+            <a:avLst/>
+          </a:prstGeom>
+          <a:solidFill>
+            <a:schemeClr val="accent1">
+              <a:lumMod val="60000"/>
+              <a:lumOff val="40000"/>
+            </a:schemeClr>
+          </a:solidFill>
+        </p:spPr>
+        <p:style>
+          <a:lnRef idx="2">
+            <a:schemeClr val="accent1">
+              <a:shade val="50000"/>
+            </a:schemeClr>
+          </a:lnRef>
+          <a:fillRef idx="1">
+            <a:schemeClr val="accent1"/>
+          </a:fillRef>
+          <a:effectRef idx="0">
+            <a:schemeClr val="accent1"/>
+          </a:effectRef>
+          <a:fontRef idx="minor">
+            <a:schemeClr val="lt1"/>
+          </a:fontRef>
+        </p:style>
+        <p:txBody>
+          <a:bodyPr vert="vert270" rtlCol="0" anchor="ctr"/>
+          <a:lstStyle/>
+          <a:p>
+            <a:pPr algn="ctr"/>
+            <a:endParaRPr lang="nl-NL"/>
+          </a:p>
+        </p:txBody>
+      </p:sp>
+      <p:sp>
+        <p:nvSpPr>
+          <p:cNvPr id="14" name="Rechthoek 13">
+            <a:extLst>
+              <a:ext uri="{FF2B5EF4-FFF2-40B4-BE49-F238E27FC236}">
+                <a16:creationId xmlns:a16="http://schemas.microsoft.com/office/drawing/2014/main" id="{D27099C0-138B-4640-92F7-85ACC334AB33}"/>
+              </a:ext>
+            </a:extLst>
+          </p:cNvPr>
+          <p:cNvSpPr/>
+          <p:nvPr/>
+        </p:nvSpPr>
+        <p:spPr>
+          <a:xfrm>
+            <a:off x="7193280" y="1487424"/>
+            <a:ext cx="835152" cy="1956816"/>
+          </a:xfrm>
+          <a:prstGeom prst="rect">
+            <a:avLst/>
+          </a:prstGeom>
+        </p:spPr>
+        <p:style>
+          <a:lnRef idx="2">
+            <a:schemeClr val="accent3">
+              <a:shade val="50000"/>
+            </a:schemeClr>
+          </a:lnRef>
+          <a:fillRef idx="1">
+            <a:schemeClr val="accent3"/>
+          </a:fillRef>
+          <a:effectRef idx="0">
+            <a:schemeClr val="accent3"/>
+          </a:effectRef>
+          <a:fontRef idx="minor">
+            <a:schemeClr val="lt1"/>
+          </a:fontRef>
+        </p:style>
+        <p:txBody>
+          <a:bodyPr vert="horz" rtlCol="0" anchor="ctr"/>
+          <a:lstStyle/>
+          <a:p>
+            <a:pPr algn="ctr"/>
+            <a:r>
+              <a:rPr lang="nl-NL" sz="1200" dirty="0" err="1">
+                <a:solidFill>
+                  <a:schemeClr val="tx1"/>
+                </a:solidFill>
+              </a:rPr>
+              <a:t>wegdeel</a:t>
+            </a:r>
+            <a:endParaRPr lang="nl-NL" sz="1200" dirty="0">
+              <a:solidFill>
+                <a:schemeClr val="tx1"/>
+              </a:solidFill>
+            </a:endParaRPr>
+          </a:p>
+        </p:txBody>
+      </p:sp>
+      <p:sp>
+        <p:nvSpPr>
+          <p:cNvPr id="15" name="Rechthoek 14">
+            <a:extLst>
+              <a:ext uri="{FF2B5EF4-FFF2-40B4-BE49-F238E27FC236}">
+                <a16:creationId xmlns:a16="http://schemas.microsoft.com/office/drawing/2014/main" id="{13014939-BFB9-4B7F-9D4A-E7DB8E0432FE}"/>
+              </a:ext>
+            </a:extLst>
+          </p:cNvPr>
+          <p:cNvSpPr/>
+          <p:nvPr/>
+        </p:nvSpPr>
+        <p:spPr>
+          <a:xfrm>
+            <a:off x="8028432" y="1487424"/>
+            <a:ext cx="603504" cy="1956816"/>
+          </a:xfrm>
+          <a:prstGeom prst="rect">
+            <a:avLst/>
+          </a:prstGeom>
+        </p:spPr>
+        <p:style>
+          <a:lnRef idx="2">
+            <a:schemeClr val="accent6">
+              <a:shade val="50000"/>
+            </a:schemeClr>
+          </a:lnRef>
+          <a:fillRef idx="1">
+            <a:schemeClr val="accent6"/>
+          </a:fillRef>
+          <a:effectRef idx="0">
+            <a:schemeClr val="accent6"/>
+          </a:effectRef>
+          <a:fontRef idx="minor">
+            <a:schemeClr val="lt1"/>
+          </a:fontRef>
+        </p:style>
+        <p:txBody>
+          <a:bodyPr vert="horz" rtlCol="0" anchor="ctr"/>
+          <a:lstStyle/>
+          <a:p>
+            <a:pPr algn="ctr"/>
+            <a:r>
+              <a:rPr lang="nl-NL" sz="1200" dirty="0">
+                <a:solidFill>
+                  <a:schemeClr val="tx1"/>
+                </a:solidFill>
+              </a:rPr>
+              <a:t>berm</a:t>
+            </a:r>
+          </a:p>
+        </p:txBody>
+      </p:sp>
+      <p:sp>
+        <p:nvSpPr>
+          <p:cNvPr id="16" name="Rechthoek 15">
+            <a:extLst>
+              <a:ext uri="{FF2B5EF4-FFF2-40B4-BE49-F238E27FC236}">
+                <a16:creationId xmlns:a16="http://schemas.microsoft.com/office/drawing/2014/main" id="{6BD64386-B5C2-482C-8AE8-1FE6555C3EDF}"/>
+              </a:ext>
+            </a:extLst>
+          </p:cNvPr>
+          <p:cNvSpPr/>
+          <p:nvPr/>
+        </p:nvSpPr>
+        <p:spPr>
+          <a:xfrm>
+            <a:off x="6589776" y="1487424"/>
+            <a:ext cx="600456" cy="1956816"/>
+          </a:xfrm>
+          <a:prstGeom prst="rect">
+            <a:avLst/>
+          </a:prstGeom>
+        </p:spPr>
+        <p:style>
+          <a:lnRef idx="2">
+            <a:schemeClr val="accent6">
+              <a:shade val="50000"/>
+            </a:schemeClr>
+          </a:lnRef>
+          <a:fillRef idx="1">
+            <a:schemeClr val="accent6"/>
+          </a:fillRef>
+          <a:effectRef idx="0">
+            <a:schemeClr val="accent6"/>
+          </a:effectRef>
+          <a:fontRef idx="minor">
+            <a:schemeClr val="lt1"/>
+          </a:fontRef>
+        </p:style>
+        <p:txBody>
+          <a:bodyPr vert="horz" rtlCol="0" anchor="ctr"/>
+          <a:lstStyle/>
+          <a:p>
+            <a:pPr algn="ctr"/>
+            <a:r>
+              <a:rPr lang="nl-NL" sz="1200" dirty="0">
+                <a:solidFill>
+                  <a:schemeClr val="tx1"/>
+                </a:solidFill>
+              </a:rPr>
+              <a:t>berm</a:t>
+            </a:r>
+          </a:p>
+        </p:txBody>
+      </p:sp>
+      <p:sp>
+        <p:nvSpPr>
+          <p:cNvPr id="17" name="Rechthoek 16">
+            <a:extLst>
+              <a:ext uri="{FF2B5EF4-FFF2-40B4-BE49-F238E27FC236}">
+                <a16:creationId xmlns:a16="http://schemas.microsoft.com/office/drawing/2014/main" id="{AEE2FCF5-4420-43B2-AB5A-AB6521250B79}"/>
+              </a:ext>
+            </a:extLst>
+          </p:cNvPr>
+          <p:cNvSpPr/>
+          <p:nvPr/>
+        </p:nvSpPr>
+        <p:spPr>
+          <a:xfrm>
+            <a:off x="6217920" y="1487424"/>
+            <a:ext cx="368808" cy="1956816"/>
+          </a:xfrm>
+          <a:prstGeom prst="rect">
+            <a:avLst/>
+          </a:prstGeom>
+          <a:solidFill>
+            <a:schemeClr val="accent1">
+              <a:lumMod val="60000"/>
+              <a:lumOff val="40000"/>
+            </a:schemeClr>
+          </a:solidFill>
+        </p:spPr>
+        <p:style>
+          <a:lnRef idx="2">
+            <a:schemeClr val="accent1">
+              <a:shade val="50000"/>
+            </a:schemeClr>
+          </a:lnRef>
+          <a:fillRef idx="1">
+            <a:schemeClr val="accent1"/>
+          </a:fillRef>
+          <a:effectRef idx="0">
+            <a:schemeClr val="accent1"/>
+          </a:effectRef>
+          <a:fontRef idx="minor">
+            <a:schemeClr val="lt1"/>
+          </a:fontRef>
+        </p:style>
+        <p:txBody>
+          <a:bodyPr vert="vert270" rtlCol="0" anchor="ctr"/>
+          <a:lstStyle/>
+          <a:p>
+            <a:pPr algn="ctr"/>
+            <a:endParaRPr lang="nl-NL"/>
+          </a:p>
+        </p:txBody>
+      </p:sp>
+      <p:sp>
+        <p:nvSpPr>
+          <p:cNvPr id="18" name="Rechthoek 17">
+            <a:extLst>
+              <a:ext uri="{FF2B5EF4-FFF2-40B4-BE49-F238E27FC236}">
+                <a16:creationId xmlns:a16="http://schemas.microsoft.com/office/drawing/2014/main" id="{A9F80DE6-95D0-4C28-BAD2-C2C94FE1B236}"/>
+              </a:ext>
+            </a:extLst>
+          </p:cNvPr>
+          <p:cNvSpPr/>
+          <p:nvPr/>
+        </p:nvSpPr>
+        <p:spPr>
+          <a:xfrm>
+            <a:off x="8631936" y="1487424"/>
+            <a:ext cx="835152" cy="1956816"/>
+          </a:xfrm>
+          <a:prstGeom prst="rect">
+            <a:avLst/>
+          </a:prstGeom>
+        </p:spPr>
+        <p:style>
+          <a:lnRef idx="2">
+            <a:schemeClr val="accent2">
+              <a:shade val="50000"/>
+            </a:schemeClr>
+          </a:lnRef>
+          <a:fillRef idx="1">
+            <a:schemeClr val="accent2"/>
+          </a:fillRef>
+          <a:effectRef idx="0">
+            <a:schemeClr val="accent2"/>
+          </a:effectRef>
+          <a:fontRef idx="minor">
+            <a:schemeClr val="lt1"/>
+          </a:fontRef>
+        </p:style>
+        <p:txBody>
+          <a:bodyPr rtlCol="0" anchor="ctr"/>
+          <a:lstStyle/>
+          <a:p>
+            <a:pPr algn="ctr"/>
+            <a:endParaRPr lang="nl-NL"/>
+          </a:p>
+        </p:txBody>
+      </p:sp>
+      <p:sp>
+        <p:nvSpPr>
+          <p:cNvPr id="19" name="Rechthoek 18">
+            <a:extLst>
+              <a:ext uri="{FF2B5EF4-FFF2-40B4-BE49-F238E27FC236}">
+                <a16:creationId xmlns:a16="http://schemas.microsoft.com/office/drawing/2014/main" id="{F7AADC66-CA09-4991-BB69-F8EC1B0DAA7D}"/>
+              </a:ext>
+            </a:extLst>
+          </p:cNvPr>
+          <p:cNvSpPr/>
+          <p:nvPr/>
+        </p:nvSpPr>
+        <p:spPr>
+          <a:xfrm>
+            <a:off x="8631936" y="1487424"/>
+            <a:ext cx="835152" cy="1956816"/>
+          </a:xfrm>
+          <a:prstGeom prst="rect">
+            <a:avLst/>
+          </a:prstGeom>
+        </p:spPr>
+        <p:style>
+          <a:lnRef idx="2">
+            <a:schemeClr val="accent3">
+              <a:shade val="50000"/>
+            </a:schemeClr>
+          </a:lnRef>
+          <a:fillRef idx="1">
+            <a:schemeClr val="accent3"/>
+          </a:fillRef>
+          <a:effectRef idx="0">
+            <a:schemeClr val="accent3"/>
+          </a:effectRef>
+          <a:fontRef idx="minor">
+            <a:schemeClr val="lt1"/>
+          </a:fontRef>
+        </p:style>
+        <p:txBody>
+          <a:bodyPr vert="horz" rtlCol="0" anchor="ctr"/>
+          <a:lstStyle/>
+          <a:p>
+            <a:pPr algn="ctr"/>
+            <a:r>
+              <a:rPr lang="nl-NL" sz="1200" dirty="0" err="1">
+                <a:solidFill>
+                  <a:schemeClr val="tx1"/>
+                </a:solidFill>
+              </a:rPr>
+              <a:t>wegdeel</a:t>
+            </a:r>
+            <a:endParaRPr lang="nl-NL" sz="1200" dirty="0">
+              <a:solidFill>
+                <a:schemeClr val="tx1"/>
+              </a:solidFill>
+            </a:endParaRPr>
+          </a:p>
+        </p:txBody>
+      </p:sp>
+      <p:cxnSp>
+        <p:nvCxnSpPr>
+          <p:cNvPr id="22" name="Rechte verbindingslijn 21">
+            <a:extLst>
+              <a:ext uri="{FF2B5EF4-FFF2-40B4-BE49-F238E27FC236}">
+                <a16:creationId xmlns:a16="http://schemas.microsoft.com/office/drawing/2014/main" id="{93AA20A3-57B1-4F96-A2FD-B5ED48566A6D}"/>
+              </a:ext>
+            </a:extLst>
+          </p:cNvPr>
+          <p:cNvCxnSpPr/>
+          <p:nvPr/>
+        </p:nvCxnSpPr>
+        <p:spPr>
+          <a:xfrm>
+            <a:off x="2977896" y="1377696"/>
+            <a:ext cx="603504" cy="0"/>
+          </a:xfrm>
+          <a:prstGeom prst="line">
+            <a:avLst/>
+          </a:prstGeom>
+          <a:ln>
+            <a:solidFill>
+              <a:schemeClr val="tx1"/>
+            </a:solidFill>
+            <a:prstDash val="lgDashDotDot"/>
+          </a:ln>
+        </p:spPr>
+        <p:style>
+          <a:lnRef idx="1">
+            <a:schemeClr val="accent1"/>
+          </a:lnRef>
+          <a:fillRef idx="0">
+            <a:schemeClr val="accent1"/>
+          </a:fillRef>
+          <a:effectRef idx="0">
+            <a:schemeClr val="accent1"/>
+          </a:effectRef>
+          <a:fontRef idx="minor">
+            <a:schemeClr val="tx1"/>
+          </a:fontRef>
+        </p:style>
+      </p:cxnSp>
+      <p:cxnSp>
+        <p:nvCxnSpPr>
+          <p:cNvPr id="23" name="Rechte verbindingslijn 22">
+            <a:extLst>
+              <a:ext uri="{FF2B5EF4-FFF2-40B4-BE49-F238E27FC236}">
+                <a16:creationId xmlns:a16="http://schemas.microsoft.com/office/drawing/2014/main" id="{24B8DE1A-6403-4CE0-B4D9-D5D371ACCAD6}"/>
+              </a:ext>
+            </a:extLst>
+          </p:cNvPr>
+          <p:cNvCxnSpPr/>
+          <p:nvPr/>
+        </p:nvCxnSpPr>
+        <p:spPr>
+          <a:xfrm>
+            <a:off x="4419600" y="1377696"/>
+            <a:ext cx="603504" cy="0"/>
+          </a:xfrm>
+          <a:prstGeom prst="line">
+            <a:avLst/>
+          </a:prstGeom>
+          <a:ln>
+            <a:solidFill>
+              <a:schemeClr val="tx1"/>
+            </a:solidFill>
+            <a:prstDash val="lgDashDotDot"/>
+          </a:ln>
+        </p:spPr>
+        <p:style>
+          <a:lnRef idx="1">
+            <a:schemeClr val="accent1"/>
+          </a:lnRef>
+          <a:fillRef idx="0">
+            <a:schemeClr val="accent1"/>
+          </a:fillRef>
+          <a:effectRef idx="0">
+            <a:schemeClr val="accent1"/>
+          </a:effectRef>
+          <a:fontRef idx="minor">
+            <a:schemeClr val="tx1"/>
+          </a:fontRef>
+        </p:style>
+      </p:cxnSp>
+      <p:cxnSp>
+        <p:nvCxnSpPr>
+          <p:cNvPr id="24" name="Rechte verbindingslijn 23">
+            <a:extLst>
+              <a:ext uri="{FF2B5EF4-FFF2-40B4-BE49-F238E27FC236}">
+                <a16:creationId xmlns:a16="http://schemas.microsoft.com/office/drawing/2014/main" id="{F9ECFCA7-4F77-4311-B9F0-FFBA41F99068}"/>
+              </a:ext>
+            </a:extLst>
+          </p:cNvPr>
+          <p:cNvCxnSpPr/>
+          <p:nvPr/>
+        </p:nvCxnSpPr>
+        <p:spPr>
+          <a:xfrm>
+            <a:off x="6586728" y="1377696"/>
+            <a:ext cx="603504" cy="0"/>
+          </a:xfrm>
+          <a:prstGeom prst="line">
+            <a:avLst/>
+          </a:prstGeom>
+          <a:ln>
+            <a:solidFill>
+              <a:schemeClr val="tx1"/>
+            </a:solidFill>
+            <a:prstDash val="lgDashDotDot"/>
+          </a:ln>
+        </p:spPr>
+        <p:style>
+          <a:lnRef idx="1">
+            <a:schemeClr val="accent1"/>
+          </a:lnRef>
+          <a:fillRef idx="0">
+            <a:schemeClr val="accent1"/>
+          </a:fillRef>
+          <a:effectRef idx="0">
+            <a:schemeClr val="accent1"/>
+          </a:effectRef>
+          <a:fontRef idx="minor">
+            <a:schemeClr val="tx1"/>
+          </a:fontRef>
+        </p:style>
+      </p:cxnSp>
+      <p:cxnSp>
+        <p:nvCxnSpPr>
+          <p:cNvPr id="25" name="Rechte verbindingslijn 24">
+            <a:extLst>
+              <a:ext uri="{FF2B5EF4-FFF2-40B4-BE49-F238E27FC236}">
+                <a16:creationId xmlns:a16="http://schemas.microsoft.com/office/drawing/2014/main" id="{BF50A89E-88C0-4940-AE80-866861EF4D74}"/>
+              </a:ext>
+            </a:extLst>
+          </p:cNvPr>
+          <p:cNvCxnSpPr/>
+          <p:nvPr/>
+        </p:nvCxnSpPr>
+        <p:spPr>
+          <a:xfrm>
+            <a:off x="8028432" y="1377696"/>
+            <a:ext cx="603504" cy="0"/>
+          </a:xfrm>
+          <a:prstGeom prst="line">
+            <a:avLst/>
+          </a:prstGeom>
+          <a:ln>
+            <a:solidFill>
+              <a:schemeClr val="tx1"/>
+            </a:solidFill>
+            <a:prstDash val="lgDashDotDot"/>
+          </a:ln>
+        </p:spPr>
+        <p:style>
+          <a:lnRef idx="1">
+            <a:schemeClr val="accent1"/>
+          </a:lnRef>
+          <a:fillRef idx="0">
+            <a:schemeClr val="accent1"/>
+          </a:fillRef>
+          <a:effectRef idx="0">
+            <a:schemeClr val="accent1"/>
+          </a:effectRef>
+          <a:fontRef idx="minor">
+            <a:schemeClr val="tx1"/>
+          </a:fontRef>
+        </p:style>
+      </p:cxnSp>
+      <p:cxnSp>
+        <p:nvCxnSpPr>
+          <p:cNvPr id="26" name="Rechte verbindingslijn 25">
+            <a:extLst>
+              <a:ext uri="{FF2B5EF4-FFF2-40B4-BE49-F238E27FC236}">
+                <a16:creationId xmlns:a16="http://schemas.microsoft.com/office/drawing/2014/main" id="{ABFF1148-1B5D-49BF-8CB0-BC25D094C7EB}"/>
+              </a:ext>
+            </a:extLst>
+          </p:cNvPr>
+          <p:cNvCxnSpPr>
+            <a:cxnSpLocks/>
+          </p:cNvCxnSpPr>
+          <p:nvPr/>
+        </p:nvCxnSpPr>
+        <p:spPr>
+          <a:xfrm>
+            <a:off x="4422648" y="4026408"/>
+            <a:ext cx="1438656" cy="0"/>
+          </a:xfrm>
+          <a:prstGeom prst="line">
+            <a:avLst/>
+          </a:prstGeom>
+          <a:ln>
+            <a:solidFill>
+              <a:schemeClr val="tx1"/>
+            </a:solidFill>
+            <a:prstDash val="lgDashDotDot"/>
+          </a:ln>
+        </p:spPr>
+        <p:style>
+          <a:lnRef idx="1">
+            <a:schemeClr val="accent1"/>
+          </a:lnRef>
+          <a:fillRef idx="0">
+            <a:schemeClr val="accent1"/>
+          </a:fillRef>
+          <a:effectRef idx="0">
+            <a:schemeClr val="accent1"/>
+          </a:effectRef>
+          <a:fontRef idx="minor">
+            <a:schemeClr val="tx1"/>
+          </a:fontRef>
+        </p:style>
+      </p:cxnSp>
+      <p:sp>
+        <p:nvSpPr>
+          <p:cNvPr id="28" name="Rechthoek 27">
+            <a:extLst>
+              <a:ext uri="{FF2B5EF4-FFF2-40B4-BE49-F238E27FC236}">
+                <a16:creationId xmlns:a16="http://schemas.microsoft.com/office/drawing/2014/main" id="{8EB7E01B-BE7A-45C6-A539-A833AC7698AC}"/>
+              </a:ext>
+            </a:extLst>
+          </p:cNvPr>
+          <p:cNvSpPr/>
+          <p:nvPr/>
+        </p:nvSpPr>
+        <p:spPr>
+          <a:xfrm>
+            <a:off x="7193280" y="4099560"/>
+            <a:ext cx="835152" cy="1956816"/>
+          </a:xfrm>
+          <a:prstGeom prst="rect">
+            <a:avLst/>
+          </a:prstGeom>
+        </p:spPr>
+        <p:style>
+          <a:lnRef idx="2">
+            <a:schemeClr val="accent3">
+              <a:shade val="50000"/>
+            </a:schemeClr>
+          </a:lnRef>
+          <a:fillRef idx="1">
+            <a:schemeClr val="accent3"/>
+          </a:fillRef>
+          <a:effectRef idx="0">
+            <a:schemeClr val="accent3"/>
+          </a:effectRef>
+          <a:fontRef idx="minor">
+            <a:schemeClr val="lt1"/>
+          </a:fontRef>
+        </p:style>
+        <p:txBody>
+          <a:bodyPr vert="horz" rtlCol="0" anchor="ctr"/>
+          <a:lstStyle/>
+          <a:p>
+            <a:pPr algn="ctr"/>
+            <a:r>
+              <a:rPr lang="nl-NL" sz="1200">
+                <a:solidFill>
+                  <a:schemeClr val="tx1"/>
+                </a:solidFill>
+              </a:rPr>
+              <a:t>wegdeel</a:t>
+            </a:r>
+            <a:endParaRPr lang="nl-NL" sz="1200" dirty="0">
+              <a:solidFill>
+                <a:schemeClr val="tx1"/>
+              </a:solidFill>
+            </a:endParaRPr>
+          </a:p>
+        </p:txBody>
+      </p:sp>
+      <p:sp>
+        <p:nvSpPr>
+          <p:cNvPr id="29" name="Rechthoek 28">
+            <a:extLst>
+              <a:ext uri="{FF2B5EF4-FFF2-40B4-BE49-F238E27FC236}">
+                <a16:creationId xmlns:a16="http://schemas.microsoft.com/office/drawing/2014/main" id="{E4A31D57-F448-4E16-8DE2-6FC5CBBC4D4F}"/>
+              </a:ext>
+            </a:extLst>
+          </p:cNvPr>
+          <p:cNvSpPr/>
+          <p:nvPr/>
+        </p:nvSpPr>
+        <p:spPr>
+          <a:xfrm>
+            <a:off x="4419600" y="4099560"/>
+            <a:ext cx="1438656" cy="1956816"/>
+          </a:xfrm>
+          <a:prstGeom prst="rect">
+            <a:avLst/>
+          </a:prstGeom>
+        </p:spPr>
+        <p:style>
+          <a:lnRef idx="2">
+            <a:schemeClr val="accent6">
+              <a:shade val="50000"/>
+            </a:schemeClr>
+          </a:lnRef>
+          <a:fillRef idx="1">
+            <a:schemeClr val="accent6"/>
+          </a:fillRef>
+          <a:effectRef idx="0">
+            <a:schemeClr val="accent6"/>
+          </a:effectRef>
+          <a:fontRef idx="minor">
+            <a:schemeClr val="lt1"/>
+          </a:fontRef>
+        </p:style>
+        <p:txBody>
+          <a:bodyPr vert="horz" rtlCol="0" anchor="ctr"/>
+          <a:lstStyle/>
+          <a:p>
+            <a:pPr algn="ctr"/>
+            <a:r>
+              <a:rPr lang="nl-NL" sz="1200" dirty="0" err="1">
+                <a:solidFill>
+                  <a:schemeClr val="tx1"/>
+                </a:solidFill>
+              </a:rPr>
+              <a:t>begroeidterreindeelgrasland</a:t>
+            </a:r>
+            <a:r>
+              <a:rPr lang="nl-NL" sz="1200" dirty="0">
+                <a:solidFill>
+                  <a:schemeClr val="tx1"/>
+                </a:solidFill>
+              </a:rPr>
+              <a:t> agrarisch</a:t>
+            </a:r>
+          </a:p>
+        </p:txBody>
+      </p:sp>
+      <p:sp>
+        <p:nvSpPr>
+          <p:cNvPr id="30" name="Rechthoek 29">
+            <a:extLst>
+              <a:ext uri="{FF2B5EF4-FFF2-40B4-BE49-F238E27FC236}">
+                <a16:creationId xmlns:a16="http://schemas.microsoft.com/office/drawing/2014/main" id="{29457E8A-365E-4E11-BA2B-028757900740}"/>
+              </a:ext>
+            </a:extLst>
+          </p:cNvPr>
+          <p:cNvSpPr/>
+          <p:nvPr/>
+        </p:nvSpPr>
+        <p:spPr>
+          <a:xfrm>
+            <a:off x="6589776" y="4099560"/>
+            <a:ext cx="600456" cy="1956816"/>
+          </a:xfrm>
+          <a:prstGeom prst="rect">
+            <a:avLst/>
+          </a:prstGeom>
+        </p:spPr>
+        <p:style>
+          <a:lnRef idx="2">
+            <a:schemeClr val="accent6">
+              <a:shade val="50000"/>
+            </a:schemeClr>
+          </a:lnRef>
+          <a:fillRef idx="1">
+            <a:schemeClr val="accent6"/>
+          </a:fillRef>
+          <a:effectRef idx="0">
+            <a:schemeClr val="accent6"/>
+          </a:effectRef>
+          <a:fontRef idx="minor">
+            <a:schemeClr val="lt1"/>
+          </a:fontRef>
+        </p:style>
+        <p:txBody>
+          <a:bodyPr vert="horz" rtlCol="0" anchor="ctr"/>
+          <a:lstStyle/>
+          <a:p>
+            <a:pPr algn="ctr"/>
+            <a:r>
+              <a:rPr lang="nl-NL" sz="1200" dirty="0">
+                <a:solidFill>
+                  <a:schemeClr val="tx1"/>
+                </a:solidFill>
+              </a:rPr>
+              <a:t>berm</a:t>
+            </a:r>
+          </a:p>
+        </p:txBody>
+      </p:sp>
+      <p:sp>
+        <p:nvSpPr>
+          <p:cNvPr id="31" name="Rechthoek 30">
+            <a:extLst>
+              <a:ext uri="{FF2B5EF4-FFF2-40B4-BE49-F238E27FC236}">
+                <a16:creationId xmlns:a16="http://schemas.microsoft.com/office/drawing/2014/main" id="{73DF6393-BE1C-43BB-9C81-B6EAB9C19422}"/>
+              </a:ext>
+            </a:extLst>
+          </p:cNvPr>
+          <p:cNvSpPr/>
+          <p:nvPr/>
+        </p:nvSpPr>
+        <p:spPr>
+          <a:xfrm>
+            <a:off x="6217920" y="4099560"/>
+            <a:ext cx="368808" cy="1956816"/>
+          </a:xfrm>
+          <a:prstGeom prst="rect">
+            <a:avLst/>
+          </a:prstGeom>
+          <a:solidFill>
+            <a:schemeClr val="accent1">
+              <a:lumMod val="60000"/>
+              <a:lumOff val="40000"/>
+            </a:schemeClr>
+          </a:solidFill>
+        </p:spPr>
+        <p:style>
+          <a:lnRef idx="2">
+            <a:schemeClr val="accent1">
+              <a:shade val="50000"/>
+            </a:schemeClr>
+          </a:lnRef>
+          <a:fillRef idx="1">
+            <a:schemeClr val="accent1"/>
+          </a:fillRef>
+          <a:effectRef idx="0">
+            <a:schemeClr val="accent1"/>
+          </a:effectRef>
+          <a:fontRef idx="minor">
+            <a:schemeClr val="lt1"/>
+          </a:fontRef>
+        </p:style>
+        <p:txBody>
+          <a:bodyPr vert="vert270" rtlCol="0" anchor="ctr"/>
+          <a:lstStyle/>
+          <a:p>
+            <a:pPr algn="ctr"/>
+            <a:r>
+              <a:rPr lang="nl-NL" sz="1200" dirty="0">
+                <a:solidFill>
+                  <a:schemeClr val="tx1"/>
+                </a:solidFill>
+              </a:rPr>
+              <a:t>water</a:t>
+            </a:r>
+          </a:p>
+        </p:txBody>
+      </p:sp>
+      <p:sp>
+        <p:nvSpPr>
+          <p:cNvPr id="32" name="Rechthoek 31">
+            <a:extLst>
+              <a:ext uri="{FF2B5EF4-FFF2-40B4-BE49-F238E27FC236}">
+                <a16:creationId xmlns:a16="http://schemas.microsoft.com/office/drawing/2014/main" id="{47D93D5F-58C1-4CC8-A13B-96DCAF75CAE5}"/>
+              </a:ext>
+            </a:extLst>
+          </p:cNvPr>
+          <p:cNvSpPr/>
+          <p:nvPr/>
+        </p:nvSpPr>
+        <p:spPr>
+          <a:xfrm>
+            <a:off x="8631936" y="4099560"/>
+            <a:ext cx="835152" cy="1956816"/>
+          </a:xfrm>
+          <a:prstGeom prst="rect">
+            <a:avLst/>
+          </a:prstGeom>
+        </p:spPr>
+        <p:style>
+          <a:lnRef idx="2">
+            <a:schemeClr val="accent2">
+              <a:shade val="50000"/>
+            </a:schemeClr>
+          </a:lnRef>
+          <a:fillRef idx="1">
+            <a:schemeClr val="accent2"/>
+          </a:fillRef>
+          <a:effectRef idx="0">
+            <a:schemeClr val="accent2"/>
+          </a:effectRef>
+          <a:fontRef idx="minor">
+            <a:schemeClr val="lt1"/>
+          </a:fontRef>
+        </p:style>
+        <p:txBody>
+          <a:bodyPr vert="vert270" rtlCol="0" anchor="ctr"/>
+          <a:lstStyle/>
+          <a:p>
+            <a:pPr algn="ctr"/>
+            <a:endParaRPr lang="nl-NL"/>
+          </a:p>
+        </p:txBody>
+      </p:sp>
+      <p:cxnSp>
+        <p:nvCxnSpPr>
+          <p:cNvPr id="33" name="Rechte verbindingslijn 32">
+            <a:extLst>
+              <a:ext uri="{FF2B5EF4-FFF2-40B4-BE49-F238E27FC236}">
+                <a16:creationId xmlns:a16="http://schemas.microsoft.com/office/drawing/2014/main" id="{8D629697-147A-4777-98D9-398E95F57E69}"/>
+              </a:ext>
+            </a:extLst>
+          </p:cNvPr>
+          <p:cNvCxnSpPr/>
+          <p:nvPr/>
+        </p:nvCxnSpPr>
+        <p:spPr>
+          <a:xfrm>
+            <a:off x="6586728" y="3989832"/>
+            <a:ext cx="603504" cy="0"/>
+          </a:xfrm>
+          <a:prstGeom prst="line">
+            <a:avLst/>
+          </a:prstGeom>
+          <a:ln>
+            <a:solidFill>
+              <a:schemeClr val="tx1"/>
+            </a:solidFill>
+            <a:prstDash val="lgDashDotDot"/>
+          </a:ln>
+        </p:spPr>
+        <p:style>
+          <a:lnRef idx="1">
+            <a:schemeClr val="accent1"/>
+          </a:lnRef>
+          <a:fillRef idx="0">
+            <a:schemeClr val="accent1"/>
+          </a:fillRef>
+          <a:effectRef idx="0">
+            <a:schemeClr val="accent1"/>
+          </a:effectRef>
+          <a:fontRef idx="minor">
+            <a:schemeClr val="tx1"/>
+          </a:fontRef>
+        </p:style>
+      </p:cxnSp>
+      <p:cxnSp>
+        <p:nvCxnSpPr>
+          <p:cNvPr id="34" name="Rechte verbindingslijn 33">
+            <a:extLst>
+              <a:ext uri="{FF2B5EF4-FFF2-40B4-BE49-F238E27FC236}">
+                <a16:creationId xmlns:a16="http://schemas.microsoft.com/office/drawing/2014/main" id="{0069F965-CA8D-4A16-BF2A-DA517604D80A}"/>
+              </a:ext>
+            </a:extLst>
+          </p:cNvPr>
+          <p:cNvCxnSpPr>
+            <a:cxnSpLocks/>
+          </p:cNvCxnSpPr>
+          <p:nvPr/>
+        </p:nvCxnSpPr>
+        <p:spPr>
+          <a:xfrm>
+            <a:off x="8028432" y="3989832"/>
+            <a:ext cx="1438656" cy="0"/>
+          </a:xfrm>
+          <a:prstGeom prst="line">
+            <a:avLst/>
+          </a:prstGeom>
+          <a:ln>
+            <a:solidFill>
+              <a:schemeClr val="tx1"/>
+            </a:solidFill>
+            <a:prstDash val="lgDashDotDot"/>
+          </a:ln>
+        </p:spPr>
+        <p:style>
+          <a:lnRef idx="1">
+            <a:schemeClr val="accent1"/>
+          </a:lnRef>
+          <a:fillRef idx="0">
+            <a:schemeClr val="accent1"/>
+          </a:fillRef>
+          <a:effectRef idx="0">
+            <a:schemeClr val="accent1"/>
+          </a:effectRef>
+          <a:fontRef idx="minor">
+            <a:schemeClr val="tx1"/>
+          </a:fontRef>
+        </p:style>
+      </p:cxnSp>
+      <p:sp>
+        <p:nvSpPr>
+          <p:cNvPr id="35" name="Rechthoek 34">
+            <a:extLst>
+              <a:ext uri="{FF2B5EF4-FFF2-40B4-BE49-F238E27FC236}">
+                <a16:creationId xmlns:a16="http://schemas.microsoft.com/office/drawing/2014/main" id="{EE2DA7F0-0EEC-4E0B-9A85-3BFE55CBA533}"/>
+              </a:ext>
+            </a:extLst>
+          </p:cNvPr>
+          <p:cNvSpPr/>
+          <p:nvPr/>
+        </p:nvSpPr>
+        <p:spPr>
+          <a:xfrm>
+            <a:off x="8028432" y="4099560"/>
+            <a:ext cx="1438656" cy="1956816"/>
+          </a:xfrm>
+          <a:prstGeom prst="rect">
+            <a:avLst/>
+          </a:prstGeom>
+          <a:solidFill>
+            <a:schemeClr val="accent6">
+              <a:lumMod val="75000"/>
+            </a:schemeClr>
+          </a:solidFill>
+        </p:spPr>
+        <p:style>
+          <a:lnRef idx="2">
+            <a:schemeClr val="accent6">
+              <a:shade val="50000"/>
+            </a:schemeClr>
+          </a:lnRef>
+          <a:fillRef idx="1">
+            <a:schemeClr val="accent6"/>
+          </a:fillRef>
+          <a:effectRef idx="0">
+            <a:schemeClr val="accent6"/>
+          </a:effectRef>
+          <a:fontRef idx="minor">
+            <a:schemeClr val="lt1"/>
+          </a:fontRef>
+        </p:style>
+        <p:txBody>
+          <a:bodyPr vert="horz" rtlCol="0" anchor="ctr"/>
+          <a:lstStyle/>
+          <a:p>
+            <a:pPr algn="ctr"/>
+            <a:r>
+              <a:rPr lang="nl-NL" sz="1200" dirty="0" err="1">
+                <a:solidFill>
+                  <a:schemeClr val="tx1"/>
+                </a:solidFill>
+              </a:rPr>
+              <a:t>begroeidterreindeelgemengd</a:t>
+            </a:r>
+            <a:r>
+              <a:rPr lang="nl-NL" sz="1200" dirty="0">
+                <a:solidFill>
+                  <a:schemeClr val="tx1"/>
+                </a:solidFill>
+              </a:rPr>
+              <a:t> bos</a:t>
+            </a:r>
+          </a:p>
+        </p:txBody>
+      </p:sp>
+      <p:sp>
+        <p:nvSpPr>
+          <p:cNvPr id="37" name="Rechthoek 36">
+            <a:extLst>
+              <a:ext uri="{FF2B5EF4-FFF2-40B4-BE49-F238E27FC236}">
+                <a16:creationId xmlns:a16="http://schemas.microsoft.com/office/drawing/2014/main" id="{656A2CFC-7E1D-48BB-B015-964874672050}"/>
+              </a:ext>
+            </a:extLst>
+          </p:cNvPr>
+          <p:cNvSpPr/>
+          <p:nvPr/>
+        </p:nvSpPr>
+        <p:spPr>
+          <a:xfrm>
+            <a:off x="2961000" y="1001673"/>
+            <a:ext cx="659156" cy="415498"/>
+          </a:xfrm>
+          <a:prstGeom prst="rect">
+            <a:avLst/>
+          </a:prstGeom>
+        </p:spPr>
+        <p:txBody>
+          <a:bodyPr wrap="none">
+            <a:spAutoFit/>
+          </a:bodyPr>
+          <a:lstStyle/>
+          <a:p>
+            <a:pPr algn="ctr"/>
+            <a:r>
+              <a:rPr lang="nl-NL" sz="1050" dirty="0"/>
+              <a:t>afstand </a:t>
+            </a:r>
+          </a:p>
+          <a:p>
+            <a:pPr algn="ctr"/>
+            <a:r>
+              <a:rPr lang="nl-NL" sz="1050" dirty="0"/>
+              <a:t>d &lt; 25 m</a:t>
+            </a:r>
+          </a:p>
+        </p:txBody>
+      </p:sp>
+      <p:sp>
+        <p:nvSpPr>
+          <p:cNvPr id="38" name="Rechthoek 37">
+            <a:extLst>
+              <a:ext uri="{FF2B5EF4-FFF2-40B4-BE49-F238E27FC236}">
+                <a16:creationId xmlns:a16="http://schemas.microsoft.com/office/drawing/2014/main" id="{00139535-FF6D-484A-87C5-659236E90DC7}"/>
+              </a:ext>
+            </a:extLst>
+          </p:cNvPr>
+          <p:cNvSpPr/>
+          <p:nvPr/>
+        </p:nvSpPr>
+        <p:spPr>
+          <a:xfrm>
+            <a:off x="4391774" y="1001673"/>
+            <a:ext cx="659156" cy="415498"/>
+          </a:xfrm>
+          <a:prstGeom prst="rect">
+            <a:avLst/>
+          </a:prstGeom>
+        </p:spPr>
+        <p:txBody>
+          <a:bodyPr wrap="none">
+            <a:spAutoFit/>
+          </a:bodyPr>
+          <a:lstStyle/>
+          <a:p>
+            <a:pPr algn="ctr"/>
+            <a:r>
+              <a:rPr lang="nl-NL" sz="1050" dirty="0"/>
+              <a:t>afstand </a:t>
+            </a:r>
+          </a:p>
+          <a:p>
+            <a:pPr algn="ctr"/>
+            <a:r>
+              <a:rPr lang="nl-NL" sz="1050" dirty="0"/>
+              <a:t>d &lt; 25 m</a:t>
+            </a:r>
+          </a:p>
+        </p:txBody>
+      </p:sp>
+      <p:sp>
+        <p:nvSpPr>
+          <p:cNvPr id="39" name="Rechthoek 38">
+            <a:extLst>
+              <a:ext uri="{FF2B5EF4-FFF2-40B4-BE49-F238E27FC236}">
+                <a16:creationId xmlns:a16="http://schemas.microsoft.com/office/drawing/2014/main" id="{D40324B7-C010-457A-A605-1F5F70060CCB}"/>
+              </a:ext>
+            </a:extLst>
+          </p:cNvPr>
+          <p:cNvSpPr/>
+          <p:nvPr/>
+        </p:nvSpPr>
+        <p:spPr>
+          <a:xfrm>
+            <a:off x="6589382" y="998774"/>
+            <a:ext cx="659156" cy="415498"/>
+          </a:xfrm>
+          <a:prstGeom prst="rect">
+            <a:avLst/>
+          </a:prstGeom>
+        </p:spPr>
+        <p:txBody>
+          <a:bodyPr wrap="none">
+            <a:spAutoFit/>
+          </a:bodyPr>
+          <a:lstStyle/>
+          <a:p>
+            <a:pPr algn="ctr"/>
+            <a:r>
+              <a:rPr lang="nl-NL" sz="1050" dirty="0"/>
+              <a:t>afstand </a:t>
+            </a:r>
+          </a:p>
+          <a:p>
+            <a:pPr algn="ctr"/>
+            <a:r>
+              <a:rPr lang="nl-NL" sz="1050" dirty="0"/>
+              <a:t>d &lt; 25 m</a:t>
+            </a:r>
+          </a:p>
+        </p:txBody>
+      </p:sp>
+      <p:sp>
+        <p:nvSpPr>
+          <p:cNvPr id="40" name="Rechthoek 39">
+            <a:extLst>
+              <a:ext uri="{FF2B5EF4-FFF2-40B4-BE49-F238E27FC236}">
+                <a16:creationId xmlns:a16="http://schemas.microsoft.com/office/drawing/2014/main" id="{57E57C4A-204A-4469-B2E3-4FA2FB9571D1}"/>
+              </a:ext>
+            </a:extLst>
+          </p:cNvPr>
+          <p:cNvSpPr/>
+          <p:nvPr/>
+        </p:nvSpPr>
+        <p:spPr>
+          <a:xfrm>
+            <a:off x="7992330" y="998774"/>
+            <a:ext cx="659156" cy="415498"/>
+          </a:xfrm>
+          <a:prstGeom prst="rect">
+            <a:avLst/>
+          </a:prstGeom>
+        </p:spPr>
+        <p:txBody>
+          <a:bodyPr wrap="none">
+            <a:spAutoFit/>
+          </a:bodyPr>
+          <a:lstStyle/>
+          <a:p>
+            <a:pPr algn="ctr"/>
+            <a:r>
+              <a:rPr lang="nl-NL" sz="1050" dirty="0"/>
+              <a:t>afstand </a:t>
+            </a:r>
+          </a:p>
+          <a:p>
+            <a:pPr algn="ctr"/>
+            <a:r>
+              <a:rPr lang="nl-NL" sz="1050" dirty="0"/>
+              <a:t>d &lt; 25 m</a:t>
+            </a:r>
+          </a:p>
+        </p:txBody>
+      </p:sp>
+      <p:cxnSp>
+        <p:nvCxnSpPr>
+          <p:cNvPr id="42" name="Rechte verbindingslijn 41">
+            <a:extLst>
+              <a:ext uri="{FF2B5EF4-FFF2-40B4-BE49-F238E27FC236}">
+                <a16:creationId xmlns:a16="http://schemas.microsoft.com/office/drawing/2014/main" id="{79A01230-5B87-4F72-A042-C5BE6EF40ED2}"/>
+              </a:ext>
+            </a:extLst>
+          </p:cNvPr>
+          <p:cNvCxnSpPr/>
+          <p:nvPr/>
+        </p:nvCxnSpPr>
+        <p:spPr>
+          <a:xfrm>
+            <a:off x="2988170" y="3986933"/>
+            <a:ext cx="603504" cy="0"/>
+          </a:xfrm>
+          <a:prstGeom prst="line">
+            <a:avLst/>
+          </a:prstGeom>
+          <a:ln>
+            <a:solidFill>
+              <a:schemeClr val="tx1"/>
+            </a:solidFill>
+            <a:prstDash val="lgDashDotDot"/>
+          </a:ln>
+        </p:spPr>
+        <p:style>
+          <a:lnRef idx="1">
+            <a:schemeClr val="accent1"/>
+          </a:lnRef>
+          <a:fillRef idx="0">
+            <a:schemeClr val="accent1"/>
+          </a:fillRef>
+          <a:effectRef idx="0">
+            <a:schemeClr val="accent1"/>
+          </a:effectRef>
+          <a:fontRef idx="minor">
+            <a:schemeClr val="tx1"/>
+          </a:fontRef>
+        </p:style>
+      </p:cxnSp>
+      <p:sp>
+        <p:nvSpPr>
+          <p:cNvPr id="43" name="Rechthoek 42">
+            <a:extLst>
+              <a:ext uri="{FF2B5EF4-FFF2-40B4-BE49-F238E27FC236}">
+                <a16:creationId xmlns:a16="http://schemas.microsoft.com/office/drawing/2014/main" id="{E7BDD358-4928-41E5-B553-66C63F587CA9}"/>
+              </a:ext>
+            </a:extLst>
+          </p:cNvPr>
+          <p:cNvSpPr/>
+          <p:nvPr/>
+        </p:nvSpPr>
+        <p:spPr>
+          <a:xfrm>
+            <a:off x="2971274" y="3610910"/>
+            <a:ext cx="659156" cy="415498"/>
+          </a:xfrm>
+          <a:prstGeom prst="rect">
+            <a:avLst/>
+          </a:prstGeom>
+        </p:spPr>
+        <p:txBody>
+          <a:bodyPr wrap="none">
+            <a:spAutoFit/>
+          </a:bodyPr>
+          <a:lstStyle/>
+          <a:p>
+            <a:pPr algn="ctr"/>
+            <a:r>
+              <a:rPr lang="nl-NL" sz="1050" dirty="0"/>
+              <a:t>afstand </a:t>
+            </a:r>
+          </a:p>
+          <a:p>
+            <a:pPr algn="ctr"/>
+            <a:r>
+              <a:rPr lang="nl-NL" sz="1050" dirty="0"/>
+              <a:t>d &lt; 25 m</a:t>
+            </a:r>
+          </a:p>
+        </p:txBody>
+      </p:sp>
+      <p:sp>
+        <p:nvSpPr>
+          <p:cNvPr id="44" name="Rechthoek 43">
+            <a:extLst>
+              <a:ext uri="{FF2B5EF4-FFF2-40B4-BE49-F238E27FC236}">
+                <a16:creationId xmlns:a16="http://schemas.microsoft.com/office/drawing/2014/main" id="{79A4EECB-1EAB-4CED-BA82-A7E83FAC753B}"/>
+              </a:ext>
+            </a:extLst>
+          </p:cNvPr>
+          <p:cNvSpPr/>
+          <p:nvPr/>
+        </p:nvSpPr>
+        <p:spPr>
+          <a:xfrm>
+            <a:off x="4809350" y="3610910"/>
+            <a:ext cx="659156" cy="415498"/>
+          </a:xfrm>
+          <a:prstGeom prst="rect">
+            <a:avLst/>
+          </a:prstGeom>
+        </p:spPr>
+        <p:txBody>
+          <a:bodyPr wrap="none">
+            <a:spAutoFit/>
+          </a:bodyPr>
+          <a:lstStyle/>
+          <a:p>
+            <a:pPr algn="ctr"/>
+            <a:r>
+              <a:rPr lang="nl-NL" sz="1050" dirty="0"/>
+              <a:t>afstand </a:t>
+            </a:r>
+          </a:p>
+          <a:p>
+            <a:pPr algn="ctr"/>
+            <a:r>
+              <a:rPr lang="nl-NL" sz="1050" dirty="0"/>
+              <a:t>d &gt; 25 m</a:t>
+            </a:r>
+          </a:p>
+        </p:txBody>
+      </p:sp>
+      <p:sp>
+        <p:nvSpPr>
+          <p:cNvPr id="45" name="Rechthoek 44">
+            <a:extLst>
+              <a:ext uri="{FF2B5EF4-FFF2-40B4-BE49-F238E27FC236}">
+                <a16:creationId xmlns:a16="http://schemas.microsoft.com/office/drawing/2014/main" id="{C6CC3B0C-7FE9-4C97-8F09-6F1CC54265DE}"/>
+              </a:ext>
+            </a:extLst>
+          </p:cNvPr>
+          <p:cNvSpPr/>
+          <p:nvPr/>
+        </p:nvSpPr>
+        <p:spPr>
+          <a:xfrm>
+            <a:off x="6558902" y="3610910"/>
+            <a:ext cx="659156" cy="415498"/>
+          </a:xfrm>
+          <a:prstGeom prst="rect">
+            <a:avLst/>
+          </a:prstGeom>
+        </p:spPr>
+        <p:txBody>
+          <a:bodyPr wrap="none">
+            <a:spAutoFit/>
+          </a:bodyPr>
+          <a:lstStyle/>
+          <a:p>
+            <a:pPr algn="ctr"/>
+            <a:r>
+              <a:rPr lang="nl-NL" sz="1050" dirty="0"/>
+              <a:t>afstand </a:t>
+            </a:r>
+          </a:p>
+          <a:p>
+            <a:pPr algn="ctr"/>
+            <a:r>
+              <a:rPr lang="nl-NL" sz="1050" dirty="0"/>
+              <a:t>d &lt; 25 m</a:t>
+            </a:r>
+          </a:p>
+        </p:txBody>
+      </p:sp>
+      <p:sp>
+        <p:nvSpPr>
+          <p:cNvPr id="46" name="Rechthoek 45">
+            <a:extLst>
+              <a:ext uri="{FF2B5EF4-FFF2-40B4-BE49-F238E27FC236}">
+                <a16:creationId xmlns:a16="http://schemas.microsoft.com/office/drawing/2014/main" id="{2610AF8D-ECAF-412E-A032-8198F885A49C}"/>
+              </a:ext>
+            </a:extLst>
+          </p:cNvPr>
+          <p:cNvSpPr/>
+          <p:nvPr/>
+        </p:nvSpPr>
+        <p:spPr>
+          <a:xfrm>
+            <a:off x="8418182" y="3610910"/>
+            <a:ext cx="659156" cy="415498"/>
+          </a:xfrm>
+          <a:prstGeom prst="rect">
+            <a:avLst/>
+          </a:prstGeom>
+        </p:spPr>
+        <p:txBody>
+          <a:bodyPr wrap="none">
+            <a:spAutoFit/>
+          </a:bodyPr>
+          <a:lstStyle/>
+          <a:p>
+            <a:pPr algn="ctr"/>
+            <a:r>
+              <a:rPr lang="nl-NL" sz="1050" dirty="0"/>
+              <a:t>afstand </a:t>
+            </a:r>
+          </a:p>
+          <a:p>
+            <a:pPr algn="ctr"/>
+            <a:r>
+              <a:rPr lang="nl-NL" sz="1050" dirty="0"/>
+              <a:t>d &gt; 25 m</a:t>
+            </a:r>
+          </a:p>
+        </p:txBody>
+      </p:sp>
+    </p:spTree>
+    <p:extLst>
+      <p:ext uri="{BB962C8B-B14F-4D97-AF65-F5344CB8AC3E}">
+        <p14:creationId xmlns:p14="http://schemas.microsoft.com/office/powerpoint/2010/main" val="3632626045"/>
+      </p:ext>
+    </p:extLst>
+  </p:cSld>
+  <p:clrMapOvr>
+    <a:masterClrMapping/>
+  </p:clrMapOvr>
+</p:sld>
+</file>
+
 <file path=ppt/theme/theme1.xml><?xml version="1.0" encoding="utf-8"?>
 <a:theme xmlns:a="http://schemas.openxmlformats.org/drawingml/2006/main" name="Kantoorthema">
   <a:themeElements>

</xml_diff>